<commit_message>
Updated slide presentation with stackoverflow questions
</commit_message>
<xml_diff>
--- a/Helper images.pptx
+++ b/Helper images.pptx
@@ -7,6 +7,8 @@
   <p:sldIdLst>
     <p:sldId id="256" r:id="rId2"/>
     <p:sldId id="257" r:id="rId3"/>
+    <p:sldId id="258" r:id="rId4"/>
+    <p:sldId id="259" r:id="rId5"/>
   </p:sldIdLst>
   <p:sldSz cx="12192000" cy="6858000"/>
   <p:notesSz cx="6858000" cy="9144000"/>
@@ -105,6 +107,11 @@
       </a:defRPr>
     </a:lvl9pPr>
   </p:defaultTextStyle>
+  <p:extLst>
+    <p:ext uri="{EFAFB233-063F-42B5-8137-9DF3F51BA10A}">
+      <p15:sldGuideLst xmlns:p15="http://schemas.microsoft.com/office/powerpoint/2012/main"/>
+    </p:ext>
+  </p:extLst>
 </p:presentation>
 </file>
 
@@ -257,7 +264,7 @@
           <a:p>
             <a:fld id="{DD0888D9-77BE-4895-8947-5429BB74C51B}" type="datetimeFigureOut">
               <a:rPr lang="en-NG" smtClean="0"/>
-              <a:t>29/08/2022</a:t>
+              <a:t>01/09/2022</a:t>
             </a:fld>
             <a:endParaRPr lang="en-NG"/>
           </a:p>
@@ -457,7 +464,7 @@
           <a:p>
             <a:fld id="{DD0888D9-77BE-4895-8947-5429BB74C51B}" type="datetimeFigureOut">
               <a:rPr lang="en-NG" smtClean="0"/>
-              <a:t>29/08/2022</a:t>
+              <a:t>01/09/2022</a:t>
             </a:fld>
             <a:endParaRPr lang="en-NG"/>
           </a:p>
@@ -667,7 +674,7 @@
           <a:p>
             <a:fld id="{DD0888D9-77BE-4895-8947-5429BB74C51B}" type="datetimeFigureOut">
               <a:rPr lang="en-NG" smtClean="0"/>
-              <a:t>29/08/2022</a:t>
+              <a:t>01/09/2022</a:t>
             </a:fld>
             <a:endParaRPr lang="en-NG"/>
           </a:p>
@@ -867,7 +874,7 @@
           <a:p>
             <a:fld id="{DD0888D9-77BE-4895-8947-5429BB74C51B}" type="datetimeFigureOut">
               <a:rPr lang="en-NG" smtClean="0"/>
-              <a:t>29/08/2022</a:t>
+              <a:t>01/09/2022</a:t>
             </a:fld>
             <a:endParaRPr lang="en-NG"/>
           </a:p>
@@ -1143,7 +1150,7 @@
           <a:p>
             <a:fld id="{DD0888D9-77BE-4895-8947-5429BB74C51B}" type="datetimeFigureOut">
               <a:rPr lang="en-NG" smtClean="0"/>
-              <a:t>29/08/2022</a:t>
+              <a:t>01/09/2022</a:t>
             </a:fld>
             <a:endParaRPr lang="en-NG"/>
           </a:p>
@@ -1411,7 +1418,7 @@
           <a:p>
             <a:fld id="{DD0888D9-77BE-4895-8947-5429BB74C51B}" type="datetimeFigureOut">
               <a:rPr lang="en-NG" smtClean="0"/>
-              <a:t>29/08/2022</a:t>
+              <a:t>01/09/2022</a:t>
             </a:fld>
             <a:endParaRPr lang="en-NG"/>
           </a:p>
@@ -1826,7 +1833,7 @@
           <a:p>
             <a:fld id="{DD0888D9-77BE-4895-8947-5429BB74C51B}" type="datetimeFigureOut">
               <a:rPr lang="en-NG" smtClean="0"/>
-              <a:t>29/08/2022</a:t>
+              <a:t>01/09/2022</a:t>
             </a:fld>
             <a:endParaRPr lang="en-NG"/>
           </a:p>
@@ -1968,7 +1975,7 @@
           <a:p>
             <a:fld id="{DD0888D9-77BE-4895-8947-5429BB74C51B}" type="datetimeFigureOut">
               <a:rPr lang="en-NG" smtClean="0"/>
-              <a:t>29/08/2022</a:t>
+              <a:t>01/09/2022</a:t>
             </a:fld>
             <a:endParaRPr lang="en-NG"/>
           </a:p>
@@ -2081,7 +2088,7 @@
           <a:p>
             <a:fld id="{DD0888D9-77BE-4895-8947-5429BB74C51B}" type="datetimeFigureOut">
               <a:rPr lang="en-NG" smtClean="0"/>
-              <a:t>29/08/2022</a:t>
+              <a:t>01/09/2022</a:t>
             </a:fld>
             <a:endParaRPr lang="en-NG"/>
           </a:p>
@@ -2394,7 +2401,7 @@
           <a:p>
             <a:fld id="{DD0888D9-77BE-4895-8947-5429BB74C51B}" type="datetimeFigureOut">
               <a:rPr lang="en-NG" smtClean="0"/>
-              <a:t>29/08/2022</a:t>
+              <a:t>01/09/2022</a:t>
             </a:fld>
             <a:endParaRPr lang="en-NG"/>
           </a:p>
@@ -2683,7 +2690,7 @@
           <a:p>
             <a:fld id="{DD0888D9-77BE-4895-8947-5429BB74C51B}" type="datetimeFigureOut">
               <a:rPr lang="en-NG" smtClean="0"/>
-              <a:t>29/08/2022</a:t>
+              <a:t>01/09/2022</a:t>
             </a:fld>
             <a:endParaRPr lang="en-NG"/>
           </a:p>
@@ -2926,7 +2933,7 @@
           <a:p>
             <a:fld id="{DD0888D9-77BE-4895-8947-5429BB74C51B}" type="datetimeFigureOut">
               <a:rPr lang="en-NG" smtClean="0"/>
-              <a:t>29/08/2022</a:t>
+              <a:t>01/09/2022</a:t>
             </a:fld>
             <a:endParaRPr lang="en-NG"/>
           </a:p>
@@ -3721,6 +3728,324 @@
 </p:sld>
 </file>
 
+<file path=ppt/slides/slide3.xml><?xml version="1.0" encoding="utf-8"?>
+<p:sld xmlns:a="http://schemas.openxmlformats.org/drawingml/2006/main" xmlns:r="http://schemas.openxmlformats.org/officeDocument/2006/relationships" xmlns:p="http://schemas.openxmlformats.org/presentationml/2006/main">
+  <p:cSld>
+    <p:spTree>
+      <p:nvGrpSpPr>
+        <p:cNvPr id="1" name=""/>
+        <p:cNvGrpSpPr/>
+        <p:nvPr/>
+      </p:nvGrpSpPr>
+      <p:grpSpPr>
+        <a:xfrm>
+          <a:off x="0" y="0"/>
+          <a:ext cx="0" cy="0"/>
+          <a:chOff x="0" y="0"/>
+          <a:chExt cx="0" cy="0"/>
+        </a:xfrm>
+      </p:grpSpPr>
+      <p:grpSp>
+        <p:nvGrpSpPr>
+          <p:cNvPr id="12" name="Group 11">
+            <a:extLst>
+              <a:ext uri="{FF2B5EF4-FFF2-40B4-BE49-F238E27FC236}">
+                <a16:creationId xmlns:a16="http://schemas.microsoft.com/office/drawing/2014/main" id="{AA5016B2-9745-4E96-83D5-46DFBE10FCB7}"/>
+              </a:ext>
+            </a:extLst>
+          </p:cNvPr>
+          <p:cNvGrpSpPr/>
+          <p:nvPr/>
+        </p:nvGrpSpPr>
+        <p:grpSpPr>
+          <a:xfrm>
+            <a:off x="956930" y="135817"/>
+            <a:ext cx="7309843" cy="4590987"/>
+            <a:chOff x="956930" y="135817"/>
+            <a:chExt cx="7309843" cy="4590987"/>
+          </a:xfrm>
+        </p:grpSpPr>
+        <p:pic>
+          <p:nvPicPr>
+            <p:cNvPr id="8" name="Picture 7">
+              <a:extLst>
+                <a:ext uri="{FF2B5EF4-FFF2-40B4-BE49-F238E27FC236}">
+                  <a16:creationId xmlns:a16="http://schemas.microsoft.com/office/drawing/2014/main" id="{F4F246CC-D1E1-4C95-BAD7-8B4A9F782BA1}"/>
+                </a:ext>
+              </a:extLst>
+            </p:cNvPr>
+            <p:cNvPicPr>
+              <a:picLocks noChangeAspect="1"/>
+            </p:cNvPicPr>
+            <p:nvPr/>
+          </p:nvPicPr>
+          <p:blipFill rotWithShape="1">
+            <a:blip r:embed="rId2"/>
+            <a:srcRect t="15797"/>
+            <a:stretch/>
+          </p:blipFill>
+          <p:spPr>
+            <a:xfrm>
+              <a:off x="1073965" y="935664"/>
+              <a:ext cx="7106015" cy="3791140"/>
+            </a:xfrm>
+            <a:prstGeom prst="rect">
+              <a:avLst/>
+            </a:prstGeom>
+          </p:spPr>
+        </p:pic>
+        <p:grpSp>
+          <p:nvGrpSpPr>
+            <p:cNvPr id="9" name="Group 8">
+              <a:extLst>
+                <a:ext uri="{FF2B5EF4-FFF2-40B4-BE49-F238E27FC236}">
+                  <a16:creationId xmlns:a16="http://schemas.microsoft.com/office/drawing/2014/main" id="{EED845EF-9E3D-47C3-9FCB-DD1D3281FC72}"/>
+                </a:ext>
+              </a:extLst>
+            </p:cNvPr>
+            <p:cNvGrpSpPr/>
+            <p:nvPr/>
+          </p:nvGrpSpPr>
+          <p:grpSpPr>
+            <a:xfrm>
+              <a:off x="956930" y="135817"/>
+              <a:ext cx="7309843" cy="900225"/>
+              <a:chOff x="956930" y="135817"/>
+              <a:chExt cx="7309843" cy="900225"/>
+            </a:xfrm>
+          </p:grpSpPr>
+          <p:pic>
+            <p:nvPicPr>
+              <p:cNvPr id="6" name="Picture 5">
+                <a:extLst>
+                  <a:ext uri="{FF2B5EF4-FFF2-40B4-BE49-F238E27FC236}">
+                    <a16:creationId xmlns:a16="http://schemas.microsoft.com/office/drawing/2014/main" id="{895EDFC4-E233-4D5E-BAB4-1AC08584F0EC}"/>
+                  </a:ext>
+                </a:extLst>
+              </p:cNvPr>
+              <p:cNvPicPr>
+                <a:picLocks noChangeAspect="1"/>
+              </p:cNvPicPr>
+              <p:nvPr/>
+            </p:nvPicPr>
+            <p:blipFill rotWithShape="1">
+              <a:blip r:embed="rId2"/>
+              <a:srcRect b="82235"/>
+              <a:stretch/>
+            </p:blipFill>
+            <p:spPr>
+              <a:xfrm>
+                <a:off x="1160758" y="135817"/>
+                <a:ext cx="7106015" cy="799847"/>
+              </a:xfrm>
+              <a:prstGeom prst="rect">
+                <a:avLst/>
+              </a:prstGeom>
+            </p:spPr>
+          </p:pic>
+          <p:sp>
+            <p:nvSpPr>
+              <p:cNvPr id="7" name="Rectangle 6">
+                <a:extLst>
+                  <a:ext uri="{FF2B5EF4-FFF2-40B4-BE49-F238E27FC236}">
+                    <a16:creationId xmlns:a16="http://schemas.microsoft.com/office/drawing/2014/main" id="{46D1D2A8-1193-42D1-A3F1-61490F431A08}"/>
+                  </a:ext>
+                </a:extLst>
+              </p:cNvPr>
+              <p:cNvSpPr/>
+              <p:nvPr/>
+            </p:nvSpPr>
+            <p:spPr>
+              <a:xfrm>
+                <a:off x="956930" y="467833"/>
+                <a:ext cx="1998921" cy="568209"/>
+              </a:xfrm>
+              <a:prstGeom prst="rect">
+                <a:avLst/>
+              </a:prstGeom>
+              <a:solidFill>
+                <a:schemeClr val="bg1"/>
+              </a:solidFill>
+              <a:ln>
+                <a:solidFill>
+                  <a:schemeClr val="bg1"/>
+                </a:solidFill>
+              </a:ln>
+            </p:spPr>
+            <p:style>
+              <a:lnRef idx="2">
+                <a:schemeClr val="accent1">
+                  <a:shade val="50000"/>
+                </a:schemeClr>
+              </a:lnRef>
+              <a:fillRef idx="1">
+                <a:schemeClr val="accent1"/>
+              </a:fillRef>
+              <a:effectRef idx="0">
+                <a:schemeClr val="accent1"/>
+              </a:effectRef>
+              <a:fontRef idx="minor">
+                <a:schemeClr val="lt1"/>
+              </a:fontRef>
+            </p:style>
+            <p:txBody>
+              <a:bodyPr rtlCol="0" anchor="ctr"/>
+              <a:lstStyle/>
+              <a:p>
+                <a:pPr algn="ctr"/>
+                <a:endParaRPr lang="en-NG"/>
+              </a:p>
+            </p:txBody>
+          </p:sp>
+        </p:grpSp>
+      </p:grpSp>
+    </p:spTree>
+    <p:extLst>
+      <p:ext uri="{BB962C8B-B14F-4D97-AF65-F5344CB8AC3E}">
+        <p14:creationId xmlns:p14="http://schemas.microsoft.com/office/powerpoint/2010/main" val="877628913"/>
+      </p:ext>
+    </p:extLst>
+  </p:cSld>
+  <p:clrMapOvr>
+    <a:masterClrMapping/>
+  </p:clrMapOvr>
+</p:sld>
+</file>
+
+<file path=ppt/slides/slide4.xml><?xml version="1.0" encoding="utf-8"?>
+<p:sld xmlns:a="http://schemas.openxmlformats.org/drawingml/2006/main" xmlns:r="http://schemas.openxmlformats.org/officeDocument/2006/relationships" xmlns:p="http://schemas.openxmlformats.org/presentationml/2006/main">
+  <p:cSld>
+    <p:spTree>
+      <p:nvGrpSpPr>
+        <p:cNvPr id="1" name=""/>
+        <p:cNvGrpSpPr/>
+        <p:nvPr/>
+      </p:nvGrpSpPr>
+      <p:grpSpPr>
+        <a:xfrm>
+          <a:off x="0" y="0"/>
+          <a:ext cx="0" cy="0"/>
+          <a:chOff x="0" y="0"/>
+          <a:chExt cx="0" cy="0"/>
+        </a:xfrm>
+      </p:grpSpPr>
+      <p:grpSp>
+        <p:nvGrpSpPr>
+          <p:cNvPr id="5" name="Group 4">
+            <a:extLst>
+              <a:ext uri="{FF2B5EF4-FFF2-40B4-BE49-F238E27FC236}">
+                <a16:creationId xmlns:a16="http://schemas.microsoft.com/office/drawing/2014/main" id="{58602E6A-00EA-4E1D-A3CD-7A8EEBE69E3E}"/>
+              </a:ext>
+            </a:extLst>
+          </p:cNvPr>
+          <p:cNvGrpSpPr/>
+          <p:nvPr/>
+        </p:nvGrpSpPr>
+        <p:grpSpPr>
+          <a:xfrm>
+            <a:off x="972926" y="742236"/>
+            <a:ext cx="6801200" cy="1798945"/>
+            <a:chOff x="972926" y="742236"/>
+            <a:chExt cx="6801200" cy="1798945"/>
+          </a:xfrm>
+        </p:grpSpPr>
+        <p:pic>
+          <p:nvPicPr>
+            <p:cNvPr id="3" name="Picture 2">
+              <a:extLst>
+                <a:ext uri="{FF2B5EF4-FFF2-40B4-BE49-F238E27FC236}">
+                  <a16:creationId xmlns:a16="http://schemas.microsoft.com/office/drawing/2014/main" id="{E202BD65-575D-4A93-A8EB-F78AA3383EB5}"/>
+                </a:ext>
+              </a:extLst>
+            </p:cNvPr>
+            <p:cNvPicPr>
+              <a:picLocks noChangeAspect="1"/>
+            </p:cNvPicPr>
+            <p:nvPr/>
+          </p:nvPicPr>
+          <p:blipFill rotWithShape="1">
+            <a:blip r:embed="rId2"/>
+            <a:srcRect b="4618"/>
+            <a:stretch/>
+          </p:blipFill>
+          <p:spPr>
+            <a:xfrm>
+              <a:off x="972926" y="742236"/>
+              <a:ext cx="6801200" cy="1798945"/>
+            </a:xfrm>
+            <a:prstGeom prst="rect">
+              <a:avLst/>
+            </a:prstGeom>
+          </p:spPr>
+        </p:pic>
+        <p:sp>
+          <p:nvSpPr>
+            <p:cNvPr id="4" name="Rectangle 3">
+              <a:extLst>
+                <a:ext uri="{FF2B5EF4-FFF2-40B4-BE49-F238E27FC236}">
+                  <a16:creationId xmlns:a16="http://schemas.microsoft.com/office/drawing/2014/main" id="{856DCFE1-70A5-4A51-BC67-380E0A9E9636}"/>
+                </a:ext>
+              </a:extLst>
+            </p:cNvPr>
+            <p:cNvSpPr/>
+            <p:nvPr/>
+          </p:nvSpPr>
+          <p:spPr>
+            <a:xfrm>
+              <a:off x="1063256" y="1158949"/>
+              <a:ext cx="1860697" cy="212651"/>
+            </a:xfrm>
+            <a:prstGeom prst="rect">
+              <a:avLst/>
+            </a:prstGeom>
+            <a:solidFill>
+              <a:schemeClr val="bg1"/>
+            </a:solidFill>
+            <a:ln>
+              <a:solidFill>
+                <a:schemeClr val="bg1"/>
+              </a:solidFill>
+            </a:ln>
+          </p:spPr>
+          <p:style>
+            <a:lnRef idx="2">
+              <a:schemeClr val="accent1">
+                <a:shade val="50000"/>
+              </a:schemeClr>
+            </a:lnRef>
+            <a:fillRef idx="1">
+              <a:schemeClr val="accent1"/>
+            </a:fillRef>
+            <a:effectRef idx="0">
+              <a:schemeClr val="accent1"/>
+            </a:effectRef>
+            <a:fontRef idx="minor">
+              <a:schemeClr val="lt1"/>
+            </a:fontRef>
+          </p:style>
+          <p:txBody>
+            <a:bodyPr rtlCol="0" anchor="ctr"/>
+            <a:lstStyle/>
+            <a:p>
+              <a:pPr algn="ctr"/>
+              <a:endParaRPr lang="en-NG"/>
+            </a:p>
+          </p:txBody>
+        </p:sp>
+      </p:grpSp>
+    </p:spTree>
+    <p:extLst>
+      <p:ext uri="{BB962C8B-B14F-4D97-AF65-F5344CB8AC3E}">
+        <p14:creationId xmlns:p14="http://schemas.microsoft.com/office/powerpoint/2010/main" val="36753342"/>
+      </p:ext>
+    </p:extLst>
+  </p:cSld>
+  <p:clrMapOvr>
+    <a:masterClrMapping/>
+  </p:clrMapOvr>
+</p:sld>
+</file>
+
 <file path=ppt/theme/theme1.xml><?xml version="1.0" encoding="utf-8"?>
 <a:theme xmlns:a="http://schemas.openxmlformats.org/drawingml/2006/main" name="Office Theme">
   <a:themeElements>

</xml_diff>